<commit_message>
final ppt, notebook pretty good
</commit_message>
<xml_diff>
--- a/Navier Stokes Presentation.pptx
+++ b/Navier Stokes Presentation.pptx
@@ -24,23 +24,23 @@
   <p:notesSz cx="6858000" cy="9144000"/>
   <p:embeddedFontLst>
     <p:embeddedFont>
+      <p:font typeface="Calibri" panose="020F0502020204030204" pitchFamily="34" charset="0"/>
+      <p:regular r:id="rId14"/>
+      <p:bold r:id="rId15"/>
+      <p:italic r:id="rId16"/>
+      <p:boldItalic r:id="rId17"/>
+    </p:embeddedFont>
+    <p:embeddedFont>
       <p:font typeface="Cambria Math" panose="02040503050406030204" pitchFamily="18" charset="0"/>
-      <p:regular r:id="rId14"/>
+      <p:regular r:id="rId18"/>
     </p:embeddedFont>
     <p:embeddedFont>
       <p:font typeface="Calibri Light" panose="020F0302020204030204" pitchFamily="34" charset="0"/>
-      <p:regular r:id="rId15"/>
-      <p:italic r:id="rId16"/>
+      <p:regular r:id="rId19"/>
+      <p:italic r:id="rId20"/>
     </p:embeddedFont>
     <p:embeddedFont>
       <p:font typeface="Playfair Display"/>
-      <p:regular r:id="rId17"/>
-      <p:bold r:id="rId18"/>
-      <p:italic r:id="rId19"/>
-      <p:boldItalic r:id="rId20"/>
-    </p:embeddedFont>
-    <p:embeddedFont>
-      <p:font typeface="Calibri" panose="020F0502020204030204" pitchFamily="34" charset="0"/>
       <p:regular r:id="rId21"/>
       <p:bold r:id="rId22"/>
       <p:italic r:id="rId23"/>
@@ -9717,8 +9717,8 @@
           </a:p>
         </p:txBody>
       </p:sp>
-      <mc:AlternateContent xmlns:mc="http://schemas.openxmlformats.org/markup-compatibility/2006">
-        <mc:Choice xmlns:a14="http://schemas.microsoft.com/office/drawing/2010/main" Requires="a14">
+      <mc:AlternateContent xmlns:mc="http://schemas.openxmlformats.org/markup-compatibility/2006" xmlns:a14="http://schemas.microsoft.com/office/drawing/2010/main">
+        <mc:Choice Requires="a14">
           <p:sp>
             <p:nvSpPr>
               <p:cNvPr id="3" name="Text Placeholder 2"/>
@@ -10498,7 +10498,7 @@
             </p:txBody>
           </p:sp>
         </mc:Choice>
-        <mc:Fallback>
+        <mc:Fallback xmlns="">
           <p:sp>
             <p:nvSpPr>
               <p:cNvPr id="3" name="Text Placeholder 2"/>
@@ -12906,6 +12906,791 @@
   <p:transition spd="slow">
     <p:cover dir="d"/>
   </p:transition>
+  <p:timing>
+    <p:tnLst>
+      <p:par>
+        <p:cTn id="1" dur="indefinite" restart="never" nodeType="tmRoot">
+          <p:childTnLst>
+            <p:seq concurrent="1" nextAc="seek">
+              <p:cTn id="2" dur="indefinite" nodeType="mainSeq">
+                <p:childTnLst>
+                  <p:par>
+                    <p:cTn id="3" fill="hold">
+                      <p:stCondLst>
+                        <p:cond delay="indefinite"/>
+                      </p:stCondLst>
+                      <p:childTnLst>
+                        <p:par>
+                          <p:cTn id="4" fill="hold">
+                            <p:stCondLst>
+                              <p:cond delay="0"/>
+                            </p:stCondLst>
+                            <p:childTnLst>
+                              <p:par>
+                                <p:cTn id="5" presetID="2" presetClass="entr" presetSubtype="8" fill="hold" grpId="0" nodeType="clickEffect">
+                                  <p:stCondLst>
+                                    <p:cond delay="0"/>
+                                  </p:stCondLst>
+                                  <p:childTnLst>
+                                    <p:set>
+                                      <p:cBhvr>
+                                        <p:cTn id="6" dur="1" fill="hold">
+                                          <p:stCondLst>
+                                            <p:cond delay="0"/>
+                                          </p:stCondLst>
+                                        </p:cTn>
+                                        <p:tgtEl>
+                                          <p:spTgt spid="71">
+                                            <p:txEl>
+                                              <p:pRg st="0" end="0"/>
+                                            </p:txEl>
+                                          </p:spTgt>
+                                        </p:tgtEl>
+                                        <p:attrNameLst>
+                                          <p:attrName>style.visibility</p:attrName>
+                                        </p:attrNameLst>
+                                      </p:cBhvr>
+                                      <p:to>
+                                        <p:strVal val="visible"/>
+                                      </p:to>
+                                    </p:set>
+                                    <p:anim calcmode="lin" valueType="num">
+                                      <p:cBhvr additive="base">
+                                        <p:cTn id="7" dur="500" fill="hold"/>
+                                        <p:tgtEl>
+                                          <p:spTgt spid="71">
+                                            <p:txEl>
+                                              <p:pRg st="0" end="0"/>
+                                            </p:txEl>
+                                          </p:spTgt>
+                                        </p:tgtEl>
+                                        <p:attrNameLst>
+                                          <p:attrName>ppt_x</p:attrName>
+                                        </p:attrNameLst>
+                                      </p:cBhvr>
+                                      <p:tavLst>
+                                        <p:tav tm="0">
+                                          <p:val>
+                                            <p:strVal val="0-#ppt_w/2"/>
+                                          </p:val>
+                                        </p:tav>
+                                        <p:tav tm="100000">
+                                          <p:val>
+                                            <p:strVal val="#ppt_x"/>
+                                          </p:val>
+                                        </p:tav>
+                                      </p:tavLst>
+                                    </p:anim>
+                                    <p:anim calcmode="lin" valueType="num">
+                                      <p:cBhvr additive="base">
+                                        <p:cTn id="8" dur="500" fill="hold"/>
+                                        <p:tgtEl>
+                                          <p:spTgt spid="71">
+                                            <p:txEl>
+                                              <p:pRg st="0" end="0"/>
+                                            </p:txEl>
+                                          </p:spTgt>
+                                        </p:tgtEl>
+                                        <p:attrNameLst>
+                                          <p:attrName>ppt_y</p:attrName>
+                                        </p:attrNameLst>
+                                      </p:cBhvr>
+                                      <p:tavLst>
+                                        <p:tav tm="0">
+                                          <p:val>
+                                            <p:strVal val="#ppt_y"/>
+                                          </p:val>
+                                        </p:tav>
+                                        <p:tav tm="100000">
+                                          <p:val>
+                                            <p:strVal val="#ppt_y"/>
+                                          </p:val>
+                                        </p:tav>
+                                      </p:tavLst>
+                                    </p:anim>
+                                  </p:childTnLst>
+                                </p:cTn>
+                              </p:par>
+                            </p:childTnLst>
+                          </p:cTn>
+                        </p:par>
+                      </p:childTnLst>
+                    </p:cTn>
+                  </p:par>
+                  <p:par>
+                    <p:cTn id="9" fill="hold">
+                      <p:stCondLst>
+                        <p:cond delay="indefinite"/>
+                      </p:stCondLst>
+                      <p:childTnLst>
+                        <p:par>
+                          <p:cTn id="10" fill="hold">
+                            <p:stCondLst>
+                              <p:cond delay="0"/>
+                            </p:stCondLst>
+                            <p:childTnLst>
+                              <p:par>
+                                <p:cTn id="11" presetID="2" presetClass="entr" presetSubtype="8" fill="hold" grpId="0" nodeType="clickEffect">
+                                  <p:stCondLst>
+                                    <p:cond delay="0"/>
+                                  </p:stCondLst>
+                                  <p:childTnLst>
+                                    <p:set>
+                                      <p:cBhvr>
+                                        <p:cTn id="12" dur="1" fill="hold">
+                                          <p:stCondLst>
+                                            <p:cond delay="0"/>
+                                          </p:stCondLst>
+                                        </p:cTn>
+                                        <p:tgtEl>
+                                          <p:spTgt spid="71">
+                                            <p:txEl>
+                                              <p:pRg st="1" end="1"/>
+                                            </p:txEl>
+                                          </p:spTgt>
+                                        </p:tgtEl>
+                                        <p:attrNameLst>
+                                          <p:attrName>style.visibility</p:attrName>
+                                        </p:attrNameLst>
+                                      </p:cBhvr>
+                                      <p:to>
+                                        <p:strVal val="visible"/>
+                                      </p:to>
+                                    </p:set>
+                                    <p:anim calcmode="lin" valueType="num">
+                                      <p:cBhvr additive="base">
+                                        <p:cTn id="13" dur="500" fill="hold"/>
+                                        <p:tgtEl>
+                                          <p:spTgt spid="71">
+                                            <p:txEl>
+                                              <p:pRg st="1" end="1"/>
+                                            </p:txEl>
+                                          </p:spTgt>
+                                        </p:tgtEl>
+                                        <p:attrNameLst>
+                                          <p:attrName>ppt_x</p:attrName>
+                                        </p:attrNameLst>
+                                      </p:cBhvr>
+                                      <p:tavLst>
+                                        <p:tav tm="0">
+                                          <p:val>
+                                            <p:strVal val="0-#ppt_w/2"/>
+                                          </p:val>
+                                        </p:tav>
+                                        <p:tav tm="100000">
+                                          <p:val>
+                                            <p:strVal val="#ppt_x"/>
+                                          </p:val>
+                                        </p:tav>
+                                      </p:tavLst>
+                                    </p:anim>
+                                    <p:anim calcmode="lin" valueType="num">
+                                      <p:cBhvr additive="base">
+                                        <p:cTn id="14" dur="500" fill="hold"/>
+                                        <p:tgtEl>
+                                          <p:spTgt spid="71">
+                                            <p:txEl>
+                                              <p:pRg st="1" end="1"/>
+                                            </p:txEl>
+                                          </p:spTgt>
+                                        </p:tgtEl>
+                                        <p:attrNameLst>
+                                          <p:attrName>ppt_y</p:attrName>
+                                        </p:attrNameLst>
+                                      </p:cBhvr>
+                                      <p:tavLst>
+                                        <p:tav tm="0">
+                                          <p:val>
+                                            <p:strVal val="#ppt_y"/>
+                                          </p:val>
+                                        </p:tav>
+                                        <p:tav tm="100000">
+                                          <p:val>
+                                            <p:strVal val="#ppt_y"/>
+                                          </p:val>
+                                        </p:tav>
+                                      </p:tavLst>
+                                    </p:anim>
+                                  </p:childTnLst>
+                                </p:cTn>
+                              </p:par>
+                            </p:childTnLst>
+                          </p:cTn>
+                        </p:par>
+                      </p:childTnLst>
+                    </p:cTn>
+                  </p:par>
+                  <p:par>
+                    <p:cTn id="15" fill="hold">
+                      <p:stCondLst>
+                        <p:cond delay="indefinite"/>
+                      </p:stCondLst>
+                      <p:childTnLst>
+                        <p:par>
+                          <p:cTn id="16" fill="hold">
+                            <p:stCondLst>
+                              <p:cond delay="0"/>
+                            </p:stCondLst>
+                            <p:childTnLst>
+                              <p:par>
+                                <p:cTn id="17" presetID="2" presetClass="entr" presetSubtype="8" fill="hold" grpId="0" nodeType="clickEffect">
+                                  <p:stCondLst>
+                                    <p:cond delay="0"/>
+                                  </p:stCondLst>
+                                  <p:childTnLst>
+                                    <p:set>
+                                      <p:cBhvr>
+                                        <p:cTn id="18" dur="1" fill="hold">
+                                          <p:stCondLst>
+                                            <p:cond delay="0"/>
+                                          </p:stCondLst>
+                                        </p:cTn>
+                                        <p:tgtEl>
+                                          <p:spTgt spid="71">
+                                            <p:txEl>
+                                              <p:pRg st="2" end="2"/>
+                                            </p:txEl>
+                                          </p:spTgt>
+                                        </p:tgtEl>
+                                        <p:attrNameLst>
+                                          <p:attrName>style.visibility</p:attrName>
+                                        </p:attrNameLst>
+                                      </p:cBhvr>
+                                      <p:to>
+                                        <p:strVal val="visible"/>
+                                      </p:to>
+                                    </p:set>
+                                    <p:anim calcmode="lin" valueType="num">
+                                      <p:cBhvr additive="base">
+                                        <p:cTn id="19" dur="500" fill="hold"/>
+                                        <p:tgtEl>
+                                          <p:spTgt spid="71">
+                                            <p:txEl>
+                                              <p:pRg st="2" end="2"/>
+                                            </p:txEl>
+                                          </p:spTgt>
+                                        </p:tgtEl>
+                                        <p:attrNameLst>
+                                          <p:attrName>ppt_x</p:attrName>
+                                        </p:attrNameLst>
+                                      </p:cBhvr>
+                                      <p:tavLst>
+                                        <p:tav tm="0">
+                                          <p:val>
+                                            <p:strVal val="0-#ppt_w/2"/>
+                                          </p:val>
+                                        </p:tav>
+                                        <p:tav tm="100000">
+                                          <p:val>
+                                            <p:strVal val="#ppt_x"/>
+                                          </p:val>
+                                        </p:tav>
+                                      </p:tavLst>
+                                    </p:anim>
+                                    <p:anim calcmode="lin" valueType="num">
+                                      <p:cBhvr additive="base">
+                                        <p:cTn id="20" dur="500" fill="hold"/>
+                                        <p:tgtEl>
+                                          <p:spTgt spid="71">
+                                            <p:txEl>
+                                              <p:pRg st="2" end="2"/>
+                                            </p:txEl>
+                                          </p:spTgt>
+                                        </p:tgtEl>
+                                        <p:attrNameLst>
+                                          <p:attrName>ppt_y</p:attrName>
+                                        </p:attrNameLst>
+                                      </p:cBhvr>
+                                      <p:tavLst>
+                                        <p:tav tm="0">
+                                          <p:val>
+                                            <p:strVal val="#ppt_y"/>
+                                          </p:val>
+                                        </p:tav>
+                                        <p:tav tm="100000">
+                                          <p:val>
+                                            <p:strVal val="#ppt_y"/>
+                                          </p:val>
+                                        </p:tav>
+                                      </p:tavLst>
+                                    </p:anim>
+                                  </p:childTnLst>
+                                </p:cTn>
+                              </p:par>
+                              <p:par>
+                                <p:cTn id="21" presetID="2" presetClass="entr" presetSubtype="8" fill="hold" grpId="0" nodeType="withEffect">
+                                  <p:stCondLst>
+                                    <p:cond delay="0"/>
+                                  </p:stCondLst>
+                                  <p:childTnLst>
+                                    <p:set>
+                                      <p:cBhvr>
+                                        <p:cTn id="22" dur="1" fill="hold">
+                                          <p:stCondLst>
+                                            <p:cond delay="0"/>
+                                          </p:stCondLst>
+                                        </p:cTn>
+                                        <p:tgtEl>
+                                          <p:spTgt spid="71">
+                                            <p:txEl>
+                                              <p:pRg st="3" end="3"/>
+                                            </p:txEl>
+                                          </p:spTgt>
+                                        </p:tgtEl>
+                                        <p:attrNameLst>
+                                          <p:attrName>style.visibility</p:attrName>
+                                        </p:attrNameLst>
+                                      </p:cBhvr>
+                                      <p:to>
+                                        <p:strVal val="visible"/>
+                                      </p:to>
+                                    </p:set>
+                                    <p:anim calcmode="lin" valueType="num">
+                                      <p:cBhvr additive="base">
+                                        <p:cTn id="23" dur="500" fill="hold"/>
+                                        <p:tgtEl>
+                                          <p:spTgt spid="71">
+                                            <p:txEl>
+                                              <p:pRg st="3" end="3"/>
+                                            </p:txEl>
+                                          </p:spTgt>
+                                        </p:tgtEl>
+                                        <p:attrNameLst>
+                                          <p:attrName>ppt_x</p:attrName>
+                                        </p:attrNameLst>
+                                      </p:cBhvr>
+                                      <p:tavLst>
+                                        <p:tav tm="0">
+                                          <p:val>
+                                            <p:strVal val="0-#ppt_w/2"/>
+                                          </p:val>
+                                        </p:tav>
+                                        <p:tav tm="100000">
+                                          <p:val>
+                                            <p:strVal val="#ppt_x"/>
+                                          </p:val>
+                                        </p:tav>
+                                      </p:tavLst>
+                                    </p:anim>
+                                    <p:anim calcmode="lin" valueType="num">
+                                      <p:cBhvr additive="base">
+                                        <p:cTn id="24" dur="500" fill="hold"/>
+                                        <p:tgtEl>
+                                          <p:spTgt spid="71">
+                                            <p:txEl>
+                                              <p:pRg st="3" end="3"/>
+                                            </p:txEl>
+                                          </p:spTgt>
+                                        </p:tgtEl>
+                                        <p:attrNameLst>
+                                          <p:attrName>ppt_y</p:attrName>
+                                        </p:attrNameLst>
+                                      </p:cBhvr>
+                                      <p:tavLst>
+                                        <p:tav tm="0">
+                                          <p:val>
+                                            <p:strVal val="#ppt_y"/>
+                                          </p:val>
+                                        </p:tav>
+                                        <p:tav tm="100000">
+                                          <p:val>
+                                            <p:strVal val="#ppt_y"/>
+                                          </p:val>
+                                        </p:tav>
+                                      </p:tavLst>
+                                    </p:anim>
+                                  </p:childTnLst>
+                                </p:cTn>
+                              </p:par>
+                              <p:par>
+                                <p:cTn id="25" presetID="2" presetClass="entr" presetSubtype="8" fill="hold" grpId="0" nodeType="withEffect">
+                                  <p:stCondLst>
+                                    <p:cond delay="0"/>
+                                  </p:stCondLst>
+                                  <p:childTnLst>
+                                    <p:set>
+                                      <p:cBhvr>
+                                        <p:cTn id="26" dur="1" fill="hold">
+                                          <p:stCondLst>
+                                            <p:cond delay="0"/>
+                                          </p:stCondLst>
+                                        </p:cTn>
+                                        <p:tgtEl>
+                                          <p:spTgt spid="71">
+                                            <p:txEl>
+                                              <p:pRg st="4" end="4"/>
+                                            </p:txEl>
+                                          </p:spTgt>
+                                        </p:tgtEl>
+                                        <p:attrNameLst>
+                                          <p:attrName>style.visibility</p:attrName>
+                                        </p:attrNameLst>
+                                      </p:cBhvr>
+                                      <p:to>
+                                        <p:strVal val="visible"/>
+                                      </p:to>
+                                    </p:set>
+                                    <p:anim calcmode="lin" valueType="num">
+                                      <p:cBhvr additive="base">
+                                        <p:cTn id="27" dur="500" fill="hold"/>
+                                        <p:tgtEl>
+                                          <p:spTgt spid="71">
+                                            <p:txEl>
+                                              <p:pRg st="4" end="4"/>
+                                            </p:txEl>
+                                          </p:spTgt>
+                                        </p:tgtEl>
+                                        <p:attrNameLst>
+                                          <p:attrName>ppt_x</p:attrName>
+                                        </p:attrNameLst>
+                                      </p:cBhvr>
+                                      <p:tavLst>
+                                        <p:tav tm="0">
+                                          <p:val>
+                                            <p:strVal val="0-#ppt_w/2"/>
+                                          </p:val>
+                                        </p:tav>
+                                        <p:tav tm="100000">
+                                          <p:val>
+                                            <p:strVal val="#ppt_x"/>
+                                          </p:val>
+                                        </p:tav>
+                                      </p:tavLst>
+                                    </p:anim>
+                                    <p:anim calcmode="lin" valueType="num">
+                                      <p:cBhvr additive="base">
+                                        <p:cTn id="28" dur="500" fill="hold"/>
+                                        <p:tgtEl>
+                                          <p:spTgt spid="71">
+                                            <p:txEl>
+                                              <p:pRg st="4" end="4"/>
+                                            </p:txEl>
+                                          </p:spTgt>
+                                        </p:tgtEl>
+                                        <p:attrNameLst>
+                                          <p:attrName>ppt_y</p:attrName>
+                                        </p:attrNameLst>
+                                      </p:cBhvr>
+                                      <p:tavLst>
+                                        <p:tav tm="0">
+                                          <p:val>
+                                            <p:strVal val="#ppt_y"/>
+                                          </p:val>
+                                        </p:tav>
+                                        <p:tav tm="100000">
+                                          <p:val>
+                                            <p:strVal val="#ppt_y"/>
+                                          </p:val>
+                                        </p:tav>
+                                      </p:tavLst>
+                                    </p:anim>
+                                  </p:childTnLst>
+                                </p:cTn>
+                              </p:par>
+                              <p:par>
+                                <p:cTn id="29" presetID="2" presetClass="entr" presetSubtype="8" fill="hold" grpId="0" nodeType="withEffect">
+                                  <p:stCondLst>
+                                    <p:cond delay="0"/>
+                                  </p:stCondLst>
+                                  <p:childTnLst>
+                                    <p:set>
+                                      <p:cBhvr>
+                                        <p:cTn id="30" dur="1" fill="hold">
+                                          <p:stCondLst>
+                                            <p:cond delay="0"/>
+                                          </p:stCondLst>
+                                        </p:cTn>
+                                        <p:tgtEl>
+                                          <p:spTgt spid="71">
+                                            <p:txEl>
+                                              <p:pRg st="5" end="5"/>
+                                            </p:txEl>
+                                          </p:spTgt>
+                                        </p:tgtEl>
+                                        <p:attrNameLst>
+                                          <p:attrName>style.visibility</p:attrName>
+                                        </p:attrNameLst>
+                                      </p:cBhvr>
+                                      <p:to>
+                                        <p:strVal val="visible"/>
+                                      </p:to>
+                                    </p:set>
+                                    <p:anim calcmode="lin" valueType="num">
+                                      <p:cBhvr additive="base">
+                                        <p:cTn id="31" dur="500" fill="hold"/>
+                                        <p:tgtEl>
+                                          <p:spTgt spid="71">
+                                            <p:txEl>
+                                              <p:pRg st="5" end="5"/>
+                                            </p:txEl>
+                                          </p:spTgt>
+                                        </p:tgtEl>
+                                        <p:attrNameLst>
+                                          <p:attrName>ppt_x</p:attrName>
+                                        </p:attrNameLst>
+                                      </p:cBhvr>
+                                      <p:tavLst>
+                                        <p:tav tm="0">
+                                          <p:val>
+                                            <p:strVal val="0-#ppt_w/2"/>
+                                          </p:val>
+                                        </p:tav>
+                                        <p:tav tm="100000">
+                                          <p:val>
+                                            <p:strVal val="#ppt_x"/>
+                                          </p:val>
+                                        </p:tav>
+                                      </p:tavLst>
+                                    </p:anim>
+                                    <p:anim calcmode="lin" valueType="num">
+                                      <p:cBhvr additive="base">
+                                        <p:cTn id="32" dur="500" fill="hold"/>
+                                        <p:tgtEl>
+                                          <p:spTgt spid="71">
+                                            <p:txEl>
+                                              <p:pRg st="5" end="5"/>
+                                            </p:txEl>
+                                          </p:spTgt>
+                                        </p:tgtEl>
+                                        <p:attrNameLst>
+                                          <p:attrName>ppt_y</p:attrName>
+                                        </p:attrNameLst>
+                                      </p:cBhvr>
+                                      <p:tavLst>
+                                        <p:tav tm="0">
+                                          <p:val>
+                                            <p:strVal val="#ppt_y"/>
+                                          </p:val>
+                                        </p:tav>
+                                        <p:tav tm="100000">
+                                          <p:val>
+                                            <p:strVal val="#ppt_y"/>
+                                          </p:val>
+                                        </p:tav>
+                                      </p:tavLst>
+                                    </p:anim>
+                                  </p:childTnLst>
+                                </p:cTn>
+                              </p:par>
+                              <p:par>
+                                <p:cTn id="33" presetID="2" presetClass="entr" presetSubtype="8" fill="hold" grpId="0" nodeType="withEffect">
+                                  <p:stCondLst>
+                                    <p:cond delay="0"/>
+                                  </p:stCondLst>
+                                  <p:childTnLst>
+                                    <p:set>
+                                      <p:cBhvr>
+                                        <p:cTn id="34" dur="1" fill="hold">
+                                          <p:stCondLst>
+                                            <p:cond delay="0"/>
+                                          </p:stCondLst>
+                                        </p:cTn>
+                                        <p:tgtEl>
+                                          <p:spTgt spid="71">
+                                            <p:txEl>
+                                              <p:pRg st="6" end="6"/>
+                                            </p:txEl>
+                                          </p:spTgt>
+                                        </p:tgtEl>
+                                        <p:attrNameLst>
+                                          <p:attrName>style.visibility</p:attrName>
+                                        </p:attrNameLst>
+                                      </p:cBhvr>
+                                      <p:to>
+                                        <p:strVal val="visible"/>
+                                      </p:to>
+                                    </p:set>
+                                    <p:anim calcmode="lin" valueType="num">
+                                      <p:cBhvr additive="base">
+                                        <p:cTn id="35" dur="500" fill="hold"/>
+                                        <p:tgtEl>
+                                          <p:spTgt spid="71">
+                                            <p:txEl>
+                                              <p:pRg st="6" end="6"/>
+                                            </p:txEl>
+                                          </p:spTgt>
+                                        </p:tgtEl>
+                                        <p:attrNameLst>
+                                          <p:attrName>ppt_x</p:attrName>
+                                        </p:attrNameLst>
+                                      </p:cBhvr>
+                                      <p:tavLst>
+                                        <p:tav tm="0">
+                                          <p:val>
+                                            <p:strVal val="0-#ppt_w/2"/>
+                                          </p:val>
+                                        </p:tav>
+                                        <p:tav tm="100000">
+                                          <p:val>
+                                            <p:strVal val="#ppt_x"/>
+                                          </p:val>
+                                        </p:tav>
+                                      </p:tavLst>
+                                    </p:anim>
+                                    <p:anim calcmode="lin" valueType="num">
+                                      <p:cBhvr additive="base">
+                                        <p:cTn id="36" dur="500" fill="hold"/>
+                                        <p:tgtEl>
+                                          <p:spTgt spid="71">
+                                            <p:txEl>
+                                              <p:pRg st="6" end="6"/>
+                                            </p:txEl>
+                                          </p:spTgt>
+                                        </p:tgtEl>
+                                        <p:attrNameLst>
+                                          <p:attrName>ppt_y</p:attrName>
+                                        </p:attrNameLst>
+                                      </p:cBhvr>
+                                      <p:tavLst>
+                                        <p:tav tm="0">
+                                          <p:val>
+                                            <p:strVal val="#ppt_y"/>
+                                          </p:val>
+                                        </p:tav>
+                                        <p:tav tm="100000">
+                                          <p:val>
+                                            <p:strVal val="#ppt_y"/>
+                                          </p:val>
+                                        </p:tav>
+                                      </p:tavLst>
+                                    </p:anim>
+                                  </p:childTnLst>
+                                </p:cTn>
+                              </p:par>
+                            </p:childTnLst>
+                          </p:cTn>
+                        </p:par>
+                      </p:childTnLst>
+                    </p:cTn>
+                  </p:par>
+                  <p:par>
+                    <p:cTn id="37" fill="hold">
+                      <p:stCondLst>
+                        <p:cond delay="indefinite"/>
+                      </p:stCondLst>
+                      <p:childTnLst>
+                        <p:par>
+                          <p:cTn id="38" fill="hold">
+                            <p:stCondLst>
+                              <p:cond delay="0"/>
+                            </p:stCondLst>
+                            <p:childTnLst>
+                              <p:par>
+                                <p:cTn id="39" presetID="2" presetClass="entr" presetSubtype="8" fill="hold" grpId="0" nodeType="clickEffect">
+                                  <p:stCondLst>
+                                    <p:cond delay="0"/>
+                                  </p:stCondLst>
+                                  <p:childTnLst>
+                                    <p:set>
+                                      <p:cBhvr>
+                                        <p:cTn id="40" dur="1" fill="hold">
+                                          <p:stCondLst>
+                                            <p:cond delay="0"/>
+                                          </p:stCondLst>
+                                        </p:cTn>
+                                        <p:tgtEl>
+                                          <p:spTgt spid="71">
+                                            <p:txEl>
+                                              <p:pRg st="7" end="7"/>
+                                            </p:txEl>
+                                          </p:spTgt>
+                                        </p:tgtEl>
+                                        <p:attrNameLst>
+                                          <p:attrName>style.visibility</p:attrName>
+                                        </p:attrNameLst>
+                                      </p:cBhvr>
+                                      <p:to>
+                                        <p:strVal val="visible"/>
+                                      </p:to>
+                                    </p:set>
+                                    <p:anim calcmode="lin" valueType="num">
+                                      <p:cBhvr additive="base">
+                                        <p:cTn id="41" dur="500" fill="hold"/>
+                                        <p:tgtEl>
+                                          <p:spTgt spid="71">
+                                            <p:txEl>
+                                              <p:pRg st="7" end="7"/>
+                                            </p:txEl>
+                                          </p:spTgt>
+                                        </p:tgtEl>
+                                        <p:attrNameLst>
+                                          <p:attrName>ppt_x</p:attrName>
+                                        </p:attrNameLst>
+                                      </p:cBhvr>
+                                      <p:tavLst>
+                                        <p:tav tm="0">
+                                          <p:val>
+                                            <p:strVal val="0-#ppt_w/2"/>
+                                          </p:val>
+                                        </p:tav>
+                                        <p:tav tm="100000">
+                                          <p:val>
+                                            <p:strVal val="#ppt_x"/>
+                                          </p:val>
+                                        </p:tav>
+                                      </p:tavLst>
+                                    </p:anim>
+                                    <p:anim calcmode="lin" valueType="num">
+                                      <p:cBhvr additive="base">
+                                        <p:cTn id="42" dur="500" fill="hold"/>
+                                        <p:tgtEl>
+                                          <p:spTgt spid="71">
+                                            <p:txEl>
+                                              <p:pRg st="7" end="7"/>
+                                            </p:txEl>
+                                          </p:spTgt>
+                                        </p:tgtEl>
+                                        <p:attrNameLst>
+                                          <p:attrName>ppt_y</p:attrName>
+                                        </p:attrNameLst>
+                                      </p:cBhvr>
+                                      <p:tavLst>
+                                        <p:tav tm="0">
+                                          <p:val>
+                                            <p:strVal val="#ppt_y"/>
+                                          </p:val>
+                                        </p:tav>
+                                        <p:tav tm="100000">
+                                          <p:val>
+                                            <p:strVal val="#ppt_y"/>
+                                          </p:val>
+                                        </p:tav>
+                                      </p:tavLst>
+                                    </p:anim>
+                                  </p:childTnLst>
+                                </p:cTn>
+                              </p:par>
+                            </p:childTnLst>
+                          </p:cTn>
+                        </p:par>
+                      </p:childTnLst>
+                    </p:cTn>
+                  </p:par>
+                </p:childTnLst>
+              </p:cTn>
+              <p:prevCondLst>
+                <p:cond evt="onPrev" delay="0">
+                  <p:tgtEl>
+                    <p:sldTgt/>
+                  </p:tgtEl>
+                </p:cond>
+              </p:prevCondLst>
+              <p:nextCondLst>
+                <p:cond evt="onNext" delay="0">
+                  <p:tgtEl>
+                    <p:sldTgt/>
+                  </p:tgtEl>
+                </p:cond>
+              </p:nextCondLst>
+            </p:seq>
+          </p:childTnLst>
+        </p:cTn>
+      </p:par>
+    </p:tnLst>
+    <p:bldLst>
+      <p:bldP spid="71" grpId="0" build="p"/>
+    </p:bldLst>
+  </p:timing>
 </p:sld>
 </file>
 
@@ -13078,6 +13863,451 @@
   <p:transition spd="slow">
     <p:cover dir="d"/>
   </p:transition>
+  <p:timing>
+    <p:tnLst>
+      <p:par>
+        <p:cTn id="1" dur="indefinite" restart="never" nodeType="tmRoot">
+          <p:childTnLst>
+            <p:seq concurrent="1" nextAc="seek">
+              <p:cTn id="2" dur="indefinite" nodeType="mainSeq">
+                <p:childTnLst>
+                  <p:par>
+                    <p:cTn id="3" fill="hold">
+                      <p:stCondLst>
+                        <p:cond delay="indefinite"/>
+                      </p:stCondLst>
+                      <p:childTnLst>
+                        <p:par>
+                          <p:cTn id="4" fill="hold">
+                            <p:stCondLst>
+                              <p:cond delay="0"/>
+                            </p:stCondLst>
+                            <p:childTnLst>
+                              <p:par>
+                                <p:cTn id="5" presetID="2" presetClass="entr" presetSubtype="8" fill="hold" grpId="0" nodeType="clickEffect">
+                                  <p:stCondLst>
+                                    <p:cond delay="0"/>
+                                  </p:stCondLst>
+                                  <p:childTnLst>
+                                    <p:set>
+                                      <p:cBhvr>
+                                        <p:cTn id="6" dur="1" fill="hold">
+                                          <p:stCondLst>
+                                            <p:cond delay="0"/>
+                                          </p:stCondLst>
+                                        </p:cTn>
+                                        <p:tgtEl>
+                                          <p:spTgt spid="89">
+                                            <p:txEl>
+                                              <p:pRg st="0" end="0"/>
+                                            </p:txEl>
+                                          </p:spTgt>
+                                        </p:tgtEl>
+                                        <p:attrNameLst>
+                                          <p:attrName>style.visibility</p:attrName>
+                                        </p:attrNameLst>
+                                      </p:cBhvr>
+                                      <p:to>
+                                        <p:strVal val="visible"/>
+                                      </p:to>
+                                    </p:set>
+                                    <p:anim calcmode="lin" valueType="num">
+                                      <p:cBhvr additive="base">
+                                        <p:cTn id="7" dur="500" fill="hold"/>
+                                        <p:tgtEl>
+                                          <p:spTgt spid="89">
+                                            <p:txEl>
+                                              <p:pRg st="0" end="0"/>
+                                            </p:txEl>
+                                          </p:spTgt>
+                                        </p:tgtEl>
+                                        <p:attrNameLst>
+                                          <p:attrName>ppt_x</p:attrName>
+                                        </p:attrNameLst>
+                                      </p:cBhvr>
+                                      <p:tavLst>
+                                        <p:tav tm="0">
+                                          <p:val>
+                                            <p:strVal val="0-#ppt_w/2"/>
+                                          </p:val>
+                                        </p:tav>
+                                        <p:tav tm="100000">
+                                          <p:val>
+                                            <p:strVal val="#ppt_x"/>
+                                          </p:val>
+                                        </p:tav>
+                                      </p:tavLst>
+                                    </p:anim>
+                                    <p:anim calcmode="lin" valueType="num">
+                                      <p:cBhvr additive="base">
+                                        <p:cTn id="8" dur="500" fill="hold"/>
+                                        <p:tgtEl>
+                                          <p:spTgt spid="89">
+                                            <p:txEl>
+                                              <p:pRg st="0" end="0"/>
+                                            </p:txEl>
+                                          </p:spTgt>
+                                        </p:tgtEl>
+                                        <p:attrNameLst>
+                                          <p:attrName>ppt_y</p:attrName>
+                                        </p:attrNameLst>
+                                      </p:cBhvr>
+                                      <p:tavLst>
+                                        <p:tav tm="0">
+                                          <p:val>
+                                            <p:strVal val="#ppt_y"/>
+                                          </p:val>
+                                        </p:tav>
+                                        <p:tav tm="100000">
+                                          <p:val>
+                                            <p:strVal val="#ppt_y"/>
+                                          </p:val>
+                                        </p:tav>
+                                      </p:tavLst>
+                                    </p:anim>
+                                  </p:childTnLst>
+                                </p:cTn>
+                              </p:par>
+                            </p:childTnLst>
+                          </p:cTn>
+                        </p:par>
+                      </p:childTnLst>
+                    </p:cTn>
+                  </p:par>
+                  <p:par>
+                    <p:cTn id="9" fill="hold">
+                      <p:stCondLst>
+                        <p:cond delay="indefinite"/>
+                      </p:stCondLst>
+                      <p:childTnLst>
+                        <p:par>
+                          <p:cTn id="10" fill="hold">
+                            <p:stCondLst>
+                              <p:cond delay="0"/>
+                            </p:stCondLst>
+                            <p:childTnLst>
+                              <p:par>
+                                <p:cTn id="11" presetID="2" presetClass="entr" presetSubtype="8" fill="hold" grpId="0" nodeType="clickEffect">
+                                  <p:stCondLst>
+                                    <p:cond delay="0"/>
+                                  </p:stCondLst>
+                                  <p:childTnLst>
+                                    <p:set>
+                                      <p:cBhvr>
+                                        <p:cTn id="12" dur="1" fill="hold">
+                                          <p:stCondLst>
+                                            <p:cond delay="0"/>
+                                          </p:stCondLst>
+                                        </p:cTn>
+                                        <p:tgtEl>
+                                          <p:spTgt spid="89">
+                                            <p:txEl>
+                                              <p:pRg st="1" end="1"/>
+                                            </p:txEl>
+                                          </p:spTgt>
+                                        </p:tgtEl>
+                                        <p:attrNameLst>
+                                          <p:attrName>style.visibility</p:attrName>
+                                        </p:attrNameLst>
+                                      </p:cBhvr>
+                                      <p:to>
+                                        <p:strVal val="visible"/>
+                                      </p:to>
+                                    </p:set>
+                                    <p:anim calcmode="lin" valueType="num">
+                                      <p:cBhvr additive="base">
+                                        <p:cTn id="13" dur="500" fill="hold"/>
+                                        <p:tgtEl>
+                                          <p:spTgt spid="89">
+                                            <p:txEl>
+                                              <p:pRg st="1" end="1"/>
+                                            </p:txEl>
+                                          </p:spTgt>
+                                        </p:tgtEl>
+                                        <p:attrNameLst>
+                                          <p:attrName>ppt_x</p:attrName>
+                                        </p:attrNameLst>
+                                      </p:cBhvr>
+                                      <p:tavLst>
+                                        <p:tav tm="0">
+                                          <p:val>
+                                            <p:strVal val="0-#ppt_w/2"/>
+                                          </p:val>
+                                        </p:tav>
+                                        <p:tav tm="100000">
+                                          <p:val>
+                                            <p:strVal val="#ppt_x"/>
+                                          </p:val>
+                                        </p:tav>
+                                      </p:tavLst>
+                                    </p:anim>
+                                    <p:anim calcmode="lin" valueType="num">
+                                      <p:cBhvr additive="base">
+                                        <p:cTn id="14" dur="500" fill="hold"/>
+                                        <p:tgtEl>
+                                          <p:spTgt spid="89">
+                                            <p:txEl>
+                                              <p:pRg st="1" end="1"/>
+                                            </p:txEl>
+                                          </p:spTgt>
+                                        </p:tgtEl>
+                                        <p:attrNameLst>
+                                          <p:attrName>ppt_y</p:attrName>
+                                        </p:attrNameLst>
+                                      </p:cBhvr>
+                                      <p:tavLst>
+                                        <p:tav tm="0">
+                                          <p:val>
+                                            <p:strVal val="#ppt_y"/>
+                                          </p:val>
+                                        </p:tav>
+                                        <p:tav tm="100000">
+                                          <p:val>
+                                            <p:strVal val="#ppt_y"/>
+                                          </p:val>
+                                        </p:tav>
+                                      </p:tavLst>
+                                    </p:anim>
+                                  </p:childTnLst>
+                                </p:cTn>
+                              </p:par>
+                            </p:childTnLst>
+                          </p:cTn>
+                        </p:par>
+                      </p:childTnLst>
+                    </p:cTn>
+                  </p:par>
+                  <p:par>
+                    <p:cTn id="15" fill="hold">
+                      <p:stCondLst>
+                        <p:cond delay="indefinite"/>
+                      </p:stCondLst>
+                      <p:childTnLst>
+                        <p:par>
+                          <p:cTn id="16" fill="hold">
+                            <p:stCondLst>
+                              <p:cond delay="0"/>
+                            </p:stCondLst>
+                            <p:childTnLst>
+                              <p:par>
+                                <p:cTn id="17" presetID="2" presetClass="entr" presetSubtype="8" fill="hold" grpId="0" nodeType="clickEffect">
+                                  <p:stCondLst>
+                                    <p:cond delay="0"/>
+                                  </p:stCondLst>
+                                  <p:childTnLst>
+                                    <p:set>
+                                      <p:cBhvr>
+                                        <p:cTn id="18" dur="1" fill="hold">
+                                          <p:stCondLst>
+                                            <p:cond delay="0"/>
+                                          </p:stCondLst>
+                                        </p:cTn>
+                                        <p:tgtEl>
+                                          <p:spTgt spid="89">
+                                            <p:txEl>
+                                              <p:pRg st="2" end="2"/>
+                                            </p:txEl>
+                                          </p:spTgt>
+                                        </p:tgtEl>
+                                        <p:attrNameLst>
+                                          <p:attrName>style.visibility</p:attrName>
+                                        </p:attrNameLst>
+                                      </p:cBhvr>
+                                      <p:to>
+                                        <p:strVal val="visible"/>
+                                      </p:to>
+                                    </p:set>
+                                    <p:anim calcmode="lin" valueType="num">
+                                      <p:cBhvr additive="base">
+                                        <p:cTn id="19" dur="500" fill="hold"/>
+                                        <p:tgtEl>
+                                          <p:spTgt spid="89">
+                                            <p:txEl>
+                                              <p:pRg st="2" end="2"/>
+                                            </p:txEl>
+                                          </p:spTgt>
+                                        </p:tgtEl>
+                                        <p:attrNameLst>
+                                          <p:attrName>ppt_x</p:attrName>
+                                        </p:attrNameLst>
+                                      </p:cBhvr>
+                                      <p:tavLst>
+                                        <p:tav tm="0">
+                                          <p:val>
+                                            <p:strVal val="0-#ppt_w/2"/>
+                                          </p:val>
+                                        </p:tav>
+                                        <p:tav tm="100000">
+                                          <p:val>
+                                            <p:strVal val="#ppt_x"/>
+                                          </p:val>
+                                        </p:tav>
+                                      </p:tavLst>
+                                    </p:anim>
+                                    <p:anim calcmode="lin" valueType="num">
+                                      <p:cBhvr additive="base">
+                                        <p:cTn id="20" dur="500" fill="hold"/>
+                                        <p:tgtEl>
+                                          <p:spTgt spid="89">
+                                            <p:txEl>
+                                              <p:pRg st="2" end="2"/>
+                                            </p:txEl>
+                                          </p:spTgt>
+                                        </p:tgtEl>
+                                        <p:attrNameLst>
+                                          <p:attrName>ppt_y</p:attrName>
+                                        </p:attrNameLst>
+                                      </p:cBhvr>
+                                      <p:tavLst>
+                                        <p:tav tm="0">
+                                          <p:val>
+                                            <p:strVal val="#ppt_y"/>
+                                          </p:val>
+                                        </p:tav>
+                                        <p:tav tm="100000">
+                                          <p:val>
+                                            <p:strVal val="#ppt_y"/>
+                                          </p:val>
+                                        </p:tav>
+                                      </p:tavLst>
+                                    </p:anim>
+                                  </p:childTnLst>
+                                </p:cTn>
+                              </p:par>
+                            </p:childTnLst>
+                          </p:cTn>
+                        </p:par>
+                      </p:childTnLst>
+                    </p:cTn>
+                  </p:par>
+                  <p:par>
+                    <p:cTn id="21" fill="hold">
+                      <p:stCondLst>
+                        <p:cond delay="indefinite"/>
+                      </p:stCondLst>
+                      <p:childTnLst>
+                        <p:par>
+                          <p:cTn id="22" fill="hold">
+                            <p:stCondLst>
+                              <p:cond delay="0"/>
+                            </p:stCondLst>
+                            <p:childTnLst>
+                              <p:par>
+                                <p:cTn id="23" presetID="2" presetClass="entr" presetSubtype="8" fill="hold" grpId="0" nodeType="clickEffect">
+                                  <p:stCondLst>
+                                    <p:cond delay="0"/>
+                                  </p:stCondLst>
+                                  <p:childTnLst>
+                                    <p:set>
+                                      <p:cBhvr>
+                                        <p:cTn id="24" dur="1" fill="hold">
+                                          <p:stCondLst>
+                                            <p:cond delay="0"/>
+                                          </p:stCondLst>
+                                        </p:cTn>
+                                        <p:tgtEl>
+                                          <p:spTgt spid="89">
+                                            <p:txEl>
+                                              <p:pRg st="3" end="3"/>
+                                            </p:txEl>
+                                          </p:spTgt>
+                                        </p:tgtEl>
+                                        <p:attrNameLst>
+                                          <p:attrName>style.visibility</p:attrName>
+                                        </p:attrNameLst>
+                                      </p:cBhvr>
+                                      <p:to>
+                                        <p:strVal val="visible"/>
+                                      </p:to>
+                                    </p:set>
+                                    <p:anim calcmode="lin" valueType="num">
+                                      <p:cBhvr additive="base">
+                                        <p:cTn id="25" dur="500" fill="hold"/>
+                                        <p:tgtEl>
+                                          <p:spTgt spid="89">
+                                            <p:txEl>
+                                              <p:pRg st="3" end="3"/>
+                                            </p:txEl>
+                                          </p:spTgt>
+                                        </p:tgtEl>
+                                        <p:attrNameLst>
+                                          <p:attrName>ppt_x</p:attrName>
+                                        </p:attrNameLst>
+                                      </p:cBhvr>
+                                      <p:tavLst>
+                                        <p:tav tm="0">
+                                          <p:val>
+                                            <p:strVal val="0-#ppt_w/2"/>
+                                          </p:val>
+                                        </p:tav>
+                                        <p:tav tm="100000">
+                                          <p:val>
+                                            <p:strVal val="#ppt_x"/>
+                                          </p:val>
+                                        </p:tav>
+                                      </p:tavLst>
+                                    </p:anim>
+                                    <p:anim calcmode="lin" valueType="num">
+                                      <p:cBhvr additive="base">
+                                        <p:cTn id="26" dur="500" fill="hold"/>
+                                        <p:tgtEl>
+                                          <p:spTgt spid="89">
+                                            <p:txEl>
+                                              <p:pRg st="3" end="3"/>
+                                            </p:txEl>
+                                          </p:spTgt>
+                                        </p:tgtEl>
+                                        <p:attrNameLst>
+                                          <p:attrName>ppt_y</p:attrName>
+                                        </p:attrNameLst>
+                                      </p:cBhvr>
+                                      <p:tavLst>
+                                        <p:tav tm="0">
+                                          <p:val>
+                                            <p:strVal val="#ppt_y"/>
+                                          </p:val>
+                                        </p:tav>
+                                        <p:tav tm="100000">
+                                          <p:val>
+                                            <p:strVal val="#ppt_y"/>
+                                          </p:val>
+                                        </p:tav>
+                                      </p:tavLst>
+                                    </p:anim>
+                                  </p:childTnLst>
+                                </p:cTn>
+                              </p:par>
+                            </p:childTnLst>
+                          </p:cTn>
+                        </p:par>
+                      </p:childTnLst>
+                    </p:cTn>
+                  </p:par>
+                </p:childTnLst>
+              </p:cTn>
+              <p:prevCondLst>
+                <p:cond evt="onPrev" delay="0">
+                  <p:tgtEl>
+                    <p:sldTgt/>
+                  </p:tgtEl>
+                </p:cond>
+              </p:prevCondLst>
+              <p:nextCondLst>
+                <p:cond evt="onNext" delay="0">
+                  <p:tgtEl>
+                    <p:sldTgt/>
+                  </p:tgtEl>
+                </p:cond>
+              </p:nextCondLst>
+            </p:seq>
+          </p:childTnLst>
+        </p:cTn>
+      </p:par>
+    </p:tnLst>
+    <p:bldLst>
+      <p:bldP spid="89" grpId="0" build="p"/>
+    </p:bldLst>
+  </p:timing>
 </p:sld>
 </file>
 
@@ -13122,8 +14352,8 @@
           </a:p>
         </p:txBody>
       </p:sp>
-      <mc:AlternateContent xmlns:mc="http://schemas.openxmlformats.org/markup-compatibility/2006">
-        <mc:Choice xmlns:a14="http://schemas.microsoft.com/office/drawing/2010/main" Requires="a14">
+      <mc:AlternateContent xmlns:mc="http://schemas.openxmlformats.org/markup-compatibility/2006" xmlns:a14="http://schemas.microsoft.com/office/drawing/2010/main">
+        <mc:Choice Requires="a14">
           <p:sp>
             <p:nvSpPr>
               <p:cNvPr id="3" name="Text Placeholder 2"/>
@@ -14281,16 +15511,7 @@
                       <a:rPr lang="en-US" sz="1600">
                         <a:latin typeface="Cambria Math" panose="02040503050406030204" pitchFamily="18" charset="0"/>
                       </a:rPr>
-                      <m:t>Δ</m:t>
-                    </m:r>
-                    <m:r>
-                      <m:rPr>
-                        <m:sty m:val="p"/>
-                      </m:rPr>
-                      <a:rPr lang="en-US" sz="1600">
-                        <a:latin typeface="Cambria Math" panose="02040503050406030204" pitchFamily="18" charset="0"/>
-                      </a:rPr>
-                      <m:t>P</m:t>
+                      <m:t>ΔP</m:t>
                     </m:r>
                     <m:r>
                       <a:rPr lang="en-US" sz="1600" i="1">
@@ -14621,7 +15842,7 @@
             </p:txBody>
           </p:sp>
         </mc:Choice>
-        <mc:Fallback>
+        <mc:Fallback xmlns="">
           <p:sp>
             <p:nvSpPr>
               <p:cNvPr id="3" name="Text Placeholder 2"/>
@@ -15672,8 +16893,8 @@
           </a:p>
         </p:txBody>
       </p:sp>
-      <mc:AlternateContent xmlns:mc="http://schemas.openxmlformats.org/markup-compatibility/2006">
-        <mc:Choice xmlns:a14="http://schemas.microsoft.com/office/drawing/2010/main" Requires="a14">
+      <mc:AlternateContent xmlns:mc="http://schemas.openxmlformats.org/markup-compatibility/2006" xmlns:a14="http://schemas.microsoft.com/office/drawing/2010/main">
+        <mc:Choice Requires="a14">
           <p:sp>
             <p:nvSpPr>
               <p:cNvPr id="3" name="Text Placeholder 2"/>
@@ -15942,7 +17163,7 @@
             </p:txBody>
           </p:sp>
         </mc:Choice>
-        <mc:Fallback>
+        <mc:Fallback xmlns="">
           <p:sp>
             <p:nvSpPr>
               <p:cNvPr id="3" name="Text Placeholder 2"/>

</xml_diff>